<commit_message>
Added pdf for slides
</commit_message>
<xml_diff>
--- a/class_01/Class_01_Intro to Programming.pptx
+++ b/class_01/Class_01_Intro to Programming.pptx
@@ -15,7 +15,7 @@
     <p:sldId id="264" r:id="rId9"/>
   </p:sldIdLst>
   <p:sldSz cx="12192000" cy="6858000"/>
-  <p:notesSz cx="6858000" cy="9144000"/>
+  <p:notesSz cx="9296400" cy="7010400"/>
   <p:defaultTextStyle>
     <a:defPPr>
       <a:defRPr lang="en-US"/>
@@ -3351,7 +3351,7 @@
           <a:p>
             <a:r>
               <a:rPr lang="en-US" dirty="0"/>
-              <a:t>Intro to Programming	</a:t>
+              <a:t>Intro to Programming	 </a:t>
             </a:r>
           </a:p>
         </p:txBody>
@@ -3380,6 +3380,18 @@
             <a:r>
               <a:rPr lang="en-US" dirty="0"/>
               <a:t>C/C++</a:t>
+            </a:r>
+          </a:p>
+          <a:p>
+            <a:r>
+              <a:rPr lang="en-US"/>
+              <a:t>Sankalp Gupta</a:t>
+            </a:r>
+          </a:p>
+          <a:p>
+            <a:r>
+              <a:rPr lang="en-US" dirty="0"/>
+              <a:t>moklaeducation@gmail.com</a:t>
             </a:r>
           </a:p>
         </p:txBody>
@@ -3758,7 +3770,7 @@
           <a:p>
             <a:r>
               <a:rPr lang="en-US" dirty="0"/>
-              <a:t>Don’t care about Computer Science</a:t>
+              <a:t>Don’t care about deep Computer Science</a:t>
             </a:r>
           </a:p>
           <a:p>
@@ -4038,7 +4050,7 @@
             <a:pPr lvl="1"/>
             <a:r>
               <a:rPr lang="en-US" dirty="0"/>
-              <a:t>Measured in Giga hertz :</a:t>
+              <a:t>Measured in Giga hertz </a:t>
             </a:r>
           </a:p>
           <a:p>
@@ -4136,13 +4148,105 @@
         </p:nvSpPr>
         <p:spPr/>
         <p:txBody>
-          <a:bodyPr/>
-          <a:lstStyle/>
-          <a:p>
-            <a:r>
-              <a:rPr lang="en-US" dirty="0"/>
-              <a:t>Lets make a program to print “Hello World”</a:t>
-            </a:r>
+          <a:bodyPr>
+            <a:normAutofit fontScale="85000" lnSpcReduction="20000"/>
+          </a:bodyPr>
+          <a:lstStyle/>
+          <a:p>
+            <a:r>
+              <a:rPr lang="en-US" dirty="0"/>
+              <a:t>Let’s go , </a:t>
+            </a:r>
+          </a:p>
+          <a:p>
+            <a:r>
+              <a:rPr lang="en-US" dirty="0"/>
+              <a:t>Program to print “Hello World”</a:t>
+            </a:r>
+          </a:p>
+          <a:p>
+            <a:pPr marL="0" indent="0">
+              <a:buNone/>
+            </a:pPr>
+            <a:r>
+              <a:rPr lang="en-US" dirty="0"/>
+              <a:t>-----</a:t>
+            </a:r>
+          </a:p>
+          <a:p>
+            <a:pPr marL="0" indent="0">
+              <a:buNone/>
+            </a:pPr>
+            <a:r>
+              <a:rPr lang="en-US" dirty="0"/>
+              <a:t>#include &lt;iostream&gt;</a:t>
+            </a:r>
+            <a:br>
+              <a:rPr lang="en-US" dirty="0"/>
+            </a:br>
+            <a:br>
+              <a:rPr lang="en-US" dirty="0"/>
+            </a:br>
+            <a:r>
+              <a:rPr lang="en-US" dirty="0"/>
+              <a:t>using namespace std;</a:t>
+            </a:r>
+            <a:br>
+              <a:rPr lang="en-US" dirty="0"/>
+            </a:br>
+            <a:br>
+              <a:rPr lang="en-US" dirty="0"/>
+            </a:br>
+            <a:r>
+              <a:rPr lang="en-US" dirty="0"/>
+              <a:t>int main()</a:t>
+            </a:r>
+          </a:p>
+          <a:p>
+            <a:pPr marL="0" indent="0">
+              <a:buNone/>
+            </a:pPr>
+            <a:r>
+              <a:rPr lang="en-US" dirty="0"/>
+              <a:t>{</a:t>
+            </a:r>
+          </a:p>
+          <a:p>
+            <a:pPr marL="0" indent="0">
+              <a:buNone/>
+            </a:pPr>
+            <a:r>
+              <a:rPr lang="en-US" dirty="0"/>
+              <a:t>     </a:t>
+            </a:r>
+            <a:r>
+              <a:rPr lang="en-US" dirty="0" err="1"/>
+              <a:t>cout</a:t>
+            </a:r>
+            <a:r>
+              <a:rPr lang="en-US" dirty="0"/>
+              <a:t> &lt;&lt; “Hello World”;</a:t>
+            </a:r>
+            <a:br>
+              <a:rPr lang="en-US" dirty="0"/>
+            </a:br>
+            <a:r>
+              <a:rPr lang="en-US" dirty="0"/>
+              <a:t>     return 0;</a:t>
+            </a:r>
+          </a:p>
+          <a:p>
+            <a:pPr marL="0" indent="0">
+              <a:buNone/>
+            </a:pPr>
+            <a:r>
+              <a:rPr lang="en-US" dirty="0"/>
+              <a:t>}</a:t>
+            </a:r>
+            <a:br>
+              <a:rPr lang="en-US" dirty="0"/>
+            </a:br>
+            <a:endParaRPr lang="en-US" dirty="0"/>
           </a:p>
         </p:txBody>
       </p:sp>

</xml_diff>